<commit_message>
opdracht3: Kleine aanpassingen PWP G36
</commit_message>
<xml_diff>
--- a/opdracht03/G36/Voorstelling G36.pptx
+++ b/opdracht03/G36/Voorstelling G36.pptx
@@ -382,7 +382,7 @@
           <a:p>
             <a:fld id="{21E0E73E-28F6-4BC4-9376-BACB29DCC267}" type="slidenum">
               <a:rPr lang="en-GB" smtClean="0"/>
-              <a:t>‹nr.›</a:t>
+              <a:t>‹#›</a:t>
             </a:fld>
             <a:endParaRPr lang="en-GB"/>
           </a:p>
@@ -759,7 +759,7 @@
           <a:p>
             <a:fld id="{BBF25187-E848-42D0-BFD9-F4D5D620A638}" type="slidenum">
               <a:rPr lang="en-GB" smtClean="0"/>
-              <a:t>‹nr.›</a:t>
+              <a:t>‹#›</a:t>
             </a:fld>
             <a:endParaRPr lang="en-GB"/>
           </a:p>
@@ -970,7 +970,7 @@
           <a:p>
             <a:fld id="{BBF25187-E848-42D0-BFD9-F4D5D620A638}" type="slidenum">
               <a:rPr lang="en-GB" smtClean="0"/>
-              <a:t>‹nr.›</a:t>
+              <a:t>‹#›</a:t>
             </a:fld>
             <a:endParaRPr lang="en-GB"/>
           </a:p>
@@ -1229,7 +1229,7 @@
           <a:p>
             <a:fld id="{BBF25187-E848-42D0-BFD9-F4D5D620A638}" type="slidenum">
               <a:rPr lang="en-GB" smtClean="0"/>
-              <a:t>‹nr.›</a:t>
+              <a:t>‹#›</a:t>
             </a:fld>
             <a:endParaRPr lang="en-GB"/>
           </a:p>
@@ -1402,7 +1402,7 @@
           <a:p>
             <a:fld id="{BBF25187-E848-42D0-BFD9-F4D5D620A638}" type="slidenum">
               <a:rPr lang="en-GB" smtClean="0"/>
-              <a:t>‹nr.›</a:t>
+              <a:t>‹#›</a:t>
             </a:fld>
             <a:endParaRPr lang="en-GB"/>
           </a:p>
@@ -1748,7 +1748,7 @@
           <a:p>
             <a:fld id="{BBF25187-E848-42D0-BFD9-F4D5D620A638}" type="slidenum">
               <a:rPr lang="en-GB" smtClean="0"/>
-              <a:t>‹nr.›</a:t>
+              <a:t>‹#›</a:t>
             </a:fld>
             <a:endParaRPr lang="en-GB"/>
           </a:p>
@@ -2026,7 +2026,7 @@
           <a:p>
             <a:fld id="{BBF25187-E848-42D0-BFD9-F4D5D620A638}" type="slidenum">
               <a:rPr lang="en-GB" smtClean="0"/>
-              <a:t>‹nr.›</a:t>
+              <a:t>‹#›</a:t>
             </a:fld>
             <a:endParaRPr lang="en-GB"/>
           </a:p>
@@ -2408,7 +2408,7 @@
           <a:p>
             <a:fld id="{BBF25187-E848-42D0-BFD9-F4D5D620A638}" type="slidenum">
               <a:rPr lang="en-GB" smtClean="0"/>
-              <a:t>‹nr.›</a:t>
+              <a:t>‹#›</a:t>
             </a:fld>
             <a:endParaRPr lang="en-GB"/>
           </a:p>
@@ -2529,7 +2529,7 @@
           <a:p>
             <a:fld id="{BBF25187-E848-42D0-BFD9-F4D5D620A638}" type="slidenum">
               <a:rPr lang="en-GB" smtClean="0"/>
-              <a:t>‹nr.›</a:t>
+              <a:t>‹#›</a:t>
             </a:fld>
             <a:endParaRPr lang="en-GB"/>
           </a:p>
@@ -2711,7 +2711,7 @@
           <a:p>
             <a:fld id="{BBF25187-E848-42D0-BFD9-F4D5D620A638}" type="slidenum">
               <a:rPr lang="en-GB" smtClean="0"/>
-              <a:t>‹nr.›</a:t>
+              <a:t>‹#›</a:t>
             </a:fld>
             <a:endParaRPr lang="en-GB"/>
           </a:p>
@@ -3081,7 +3081,7 @@
           <a:p>
             <a:fld id="{BBF25187-E848-42D0-BFD9-F4D5D620A638}" type="slidenum">
               <a:rPr lang="en-GB" smtClean="0"/>
-              <a:t>‹nr.›</a:t>
+              <a:t>‹#›</a:t>
             </a:fld>
             <a:endParaRPr lang="en-GB"/>
           </a:p>
@@ -3440,7 +3440,7 @@
           <a:p>
             <a:fld id="{BBF25187-E848-42D0-BFD9-F4D5D620A638}" type="slidenum">
               <a:rPr lang="en-GB" smtClean="0"/>
-              <a:t>‹nr.›</a:t>
+              <a:t>‹#›</a:t>
             </a:fld>
             <a:endParaRPr lang="en-GB"/>
           </a:p>
@@ -3762,7 +3762,7 @@
           <a:p>
             <a:fld id="{BBF25187-E848-42D0-BFD9-F4D5D620A638}" type="slidenum">
               <a:rPr lang="en-GB" smtClean="0"/>
-              <a:t>‹nr.›</a:t>
+              <a:t>‹#›</a:t>
             </a:fld>
             <a:endParaRPr lang="en-GB"/>
           </a:p>
@@ -10748,10 +10748,10 @@
       </p:sp>
       <p:pic>
         <p:nvPicPr>
-          <p:cNvPr id="5" name="Afbeelding 4">
+          <p:cNvPr id="4" name="Picture 3">
             <a:extLst>
               <a:ext uri="{FF2B5EF4-FFF2-40B4-BE49-F238E27FC236}">
-                <a16:creationId xmlns:a16="http://schemas.microsoft.com/office/drawing/2014/main" id="{9F04EF11-97C6-45FA-AD3F-63E25A06578E}"/>
+                <a16:creationId xmlns:a16="http://schemas.microsoft.com/office/drawing/2014/main" id="{44BE4BB8-AD65-41B8-8A48-B18AA0F140B6}"/>
               </a:ext>
             </a:extLst>
           </p:cNvPr>
@@ -10768,8 +10768,8 @@
         </p:blipFill>
         <p:spPr>
           <a:xfrm>
-            <a:off x="1633542" y="1845734"/>
-            <a:ext cx="8985875" cy="4097866"/>
+            <a:off x="1174918" y="1636772"/>
+            <a:ext cx="10058400" cy="4681268"/>
           </a:xfrm>
           <a:prstGeom prst="rect">
             <a:avLst/>

</xml_diff>

<commit_message>
Small changes PWP G36
</commit_message>
<xml_diff>
--- a/opdracht03/G36/Voorstelling G36.pptx
+++ b/opdracht03/G36/Voorstelling G36.pptx
@@ -223,7 +223,7 @@
           <a:p>
             <a:fld id="{8795BD13-A9C0-4833-9A37-05C32DB0F83C}" type="datetimeFigureOut">
               <a:rPr lang="en-GB" smtClean="0"/>
-              <a:t>05/05/2019</a:t>
+              <a:t>06/05/2019</a:t>
             </a:fld>
             <a:endParaRPr lang="en-GB"/>
           </a:p>
@@ -382,7 +382,7 @@
           <a:p>
             <a:fld id="{21E0E73E-28F6-4BC4-9376-BACB29DCC267}" type="slidenum">
               <a:rPr lang="en-GB" smtClean="0"/>
-              <a:t>‹#›</a:t>
+              <a:t>‹nr.›</a:t>
             </a:fld>
             <a:endParaRPr lang="en-GB"/>
           </a:p>
@@ -717,7 +717,7 @@
           <a:p>
             <a:fld id="{76FCA46D-55D7-4D00-B507-F3F903E4163B}" type="datetimeFigureOut">
               <a:rPr lang="en-GB" smtClean="0"/>
-              <a:t>05/05/2019</a:t>
+              <a:t>06/05/2019</a:t>
             </a:fld>
             <a:endParaRPr lang="en-GB"/>
           </a:p>
@@ -759,7 +759,7 @@
           <a:p>
             <a:fld id="{BBF25187-E848-42D0-BFD9-F4D5D620A638}" type="slidenum">
               <a:rPr lang="en-GB" smtClean="0"/>
-              <a:t>‹#›</a:t>
+              <a:t>‹nr.›</a:t>
             </a:fld>
             <a:endParaRPr lang="en-GB"/>
           </a:p>
@@ -928,7 +928,7 @@
           <a:p>
             <a:fld id="{76FCA46D-55D7-4D00-B507-F3F903E4163B}" type="datetimeFigureOut">
               <a:rPr lang="en-GB" smtClean="0"/>
-              <a:t>05/05/2019</a:t>
+              <a:t>06/05/2019</a:t>
             </a:fld>
             <a:endParaRPr lang="en-GB"/>
           </a:p>
@@ -970,7 +970,7 @@
           <a:p>
             <a:fld id="{BBF25187-E848-42D0-BFD9-F4D5D620A638}" type="slidenum">
               <a:rPr lang="en-GB" smtClean="0"/>
-              <a:t>‹#›</a:t>
+              <a:t>‹nr.›</a:t>
             </a:fld>
             <a:endParaRPr lang="en-GB"/>
           </a:p>
@@ -1187,7 +1187,7 @@
           <a:p>
             <a:fld id="{76FCA46D-55D7-4D00-B507-F3F903E4163B}" type="datetimeFigureOut">
               <a:rPr lang="en-GB" smtClean="0"/>
-              <a:t>05/05/2019</a:t>
+              <a:t>06/05/2019</a:t>
             </a:fld>
             <a:endParaRPr lang="en-GB"/>
           </a:p>
@@ -1229,7 +1229,7 @@
           <a:p>
             <a:fld id="{BBF25187-E848-42D0-BFD9-F4D5D620A638}" type="slidenum">
               <a:rPr lang="en-GB" smtClean="0"/>
-              <a:t>‹#›</a:t>
+              <a:t>‹nr.›</a:t>
             </a:fld>
             <a:endParaRPr lang="en-GB"/>
           </a:p>
@@ -1360,7 +1360,7 @@
           <a:p>
             <a:fld id="{76FCA46D-55D7-4D00-B507-F3F903E4163B}" type="datetimeFigureOut">
               <a:rPr lang="en-GB" smtClean="0"/>
-              <a:t>05/05/2019</a:t>
+              <a:t>06/05/2019</a:t>
             </a:fld>
             <a:endParaRPr lang="en-GB"/>
           </a:p>
@@ -1402,7 +1402,7 @@
           <a:p>
             <a:fld id="{BBF25187-E848-42D0-BFD9-F4D5D620A638}" type="slidenum">
               <a:rPr lang="en-GB" smtClean="0"/>
-              <a:t>‹#›</a:t>
+              <a:t>‹nr.›</a:t>
             </a:fld>
             <a:endParaRPr lang="en-GB"/>
           </a:p>
@@ -1706,7 +1706,7 @@
           <a:p>
             <a:fld id="{76FCA46D-55D7-4D00-B507-F3F903E4163B}" type="datetimeFigureOut">
               <a:rPr lang="en-GB" smtClean="0"/>
-              <a:t>05/05/2019</a:t>
+              <a:t>06/05/2019</a:t>
             </a:fld>
             <a:endParaRPr lang="en-GB"/>
           </a:p>
@@ -1748,7 +1748,7 @@
           <a:p>
             <a:fld id="{BBF25187-E848-42D0-BFD9-F4D5D620A638}" type="slidenum">
               <a:rPr lang="en-GB" smtClean="0"/>
-              <a:t>‹#›</a:t>
+              <a:t>‹nr.›</a:t>
             </a:fld>
             <a:endParaRPr lang="en-GB"/>
           </a:p>
@@ -1984,7 +1984,7 @@
           <a:p>
             <a:fld id="{76FCA46D-55D7-4D00-B507-F3F903E4163B}" type="datetimeFigureOut">
               <a:rPr lang="en-GB" smtClean="0"/>
-              <a:t>05/05/2019</a:t>
+              <a:t>06/05/2019</a:t>
             </a:fld>
             <a:endParaRPr lang="en-GB"/>
           </a:p>
@@ -2026,7 +2026,7 @@
           <a:p>
             <a:fld id="{BBF25187-E848-42D0-BFD9-F4D5D620A638}" type="slidenum">
               <a:rPr lang="en-GB" smtClean="0"/>
-              <a:t>‹#›</a:t>
+              <a:t>‹nr.›</a:t>
             </a:fld>
             <a:endParaRPr lang="en-GB"/>
           </a:p>
@@ -2366,7 +2366,7 @@
           <a:p>
             <a:fld id="{76FCA46D-55D7-4D00-B507-F3F903E4163B}" type="datetimeFigureOut">
               <a:rPr lang="en-GB" smtClean="0"/>
-              <a:t>05/05/2019</a:t>
+              <a:t>06/05/2019</a:t>
             </a:fld>
             <a:endParaRPr lang="en-GB"/>
           </a:p>
@@ -2408,7 +2408,7 @@
           <a:p>
             <a:fld id="{BBF25187-E848-42D0-BFD9-F4D5D620A638}" type="slidenum">
               <a:rPr lang="en-GB" smtClean="0"/>
-              <a:t>‹#›</a:t>
+              <a:t>‹nr.›</a:t>
             </a:fld>
             <a:endParaRPr lang="en-GB"/>
           </a:p>
@@ -2487,7 +2487,7 @@
           <a:p>
             <a:fld id="{76FCA46D-55D7-4D00-B507-F3F903E4163B}" type="datetimeFigureOut">
               <a:rPr lang="en-GB" smtClean="0"/>
-              <a:t>05/05/2019</a:t>
+              <a:t>06/05/2019</a:t>
             </a:fld>
             <a:endParaRPr lang="en-GB"/>
           </a:p>
@@ -2529,7 +2529,7 @@
           <a:p>
             <a:fld id="{BBF25187-E848-42D0-BFD9-F4D5D620A638}" type="slidenum">
               <a:rPr lang="en-GB" smtClean="0"/>
-              <a:t>‹#›</a:t>
+              <a:t>‹nr.›</a:t>
             </a:fld>
             <a:endParaRPr lang="en-GB"/>
           </a:p>
@@ -2661,7 +2661,7 @@
           <a:p>
             <a:fld id="{76FCA46D-55D7-4D00-B507-F3F903E4163B}" type="datetimeFigureOut">
               <a:rPr lang="en-GB" smtClean="0"/>
-              <a:t>05/05/2019</a:t>
+              <a:t>06/05/2019</a:t>
             </a:fld>
             <a:endParaRPr lang="en-GB"/>
           </a:p>
@@ -2711,7 +2711,7 @@
           <a:p>
             <a:fld id="{BBF25187-E848-42D0-BFD9-F4D5D620A638}" type="slidenum">
               <a:rPr lang="en-GB" smtClean="0"/>
-              <a:t>‹#›</a:t>
+              <a:t>‹nr.›</a:t>
             </a:fld>
             <a:endParaRPr lang="en-GB"/>
           </a:p>
@@ -3018,7 +3018,7 @@
           <a:p>
             <a:fld id="{76FCA46D-55D7-4D00-B507-F3F903E4163B}" type="datetimeFigureOut">
               <a:rPr lang="en-GB" smtClean="0"/>
-              <a:t>05/05/2019</a:t>
+              <a:t>06/05/2019</a:t>
             </a:fld>
             <a:endParaRPr lang="en-GB"/>
           </a:p>
@@ -3081,7 +3081,7 @@
           <a:p>
             <a:fld id="{BBF25187-E848-42D0-BFD9-F4D5D620A638}" type="slidenum">
               <a:rPr lang="en-GB" smtClean="0"/>
-              <a:t>‹#›</a:t>
+              <a:t>‹nr.›</a:t>
             </a:fld>
             <a:endParaRPr lang="en-GB"/>
           </a:p>
@@ -3398,7 +3398,7 @@
           <a:p>
             <a:fld id="{76FCA46D-55D7-4D00-B507-F3F903E4163B}" type="datetimeFigureOut">
               <a:rPr lang="en-GB" smtClean="0"/>
-              <a:t>05/05/2019</a:t>
+              <a:t>06/05/2019</a:t>
             </a:fld>
             <a:endParaRPr lang="en-GB"/>
           </a:p>
@@ -3440,7 +3440,7 @@
           <a:p>
             <a:fld id="{BBF25187-E848-42D0-BFD9-F4D5D620A638}" type="slidenum">
               <a:rPr lang="en-GB" smtClean="0"/>
-              <a:t>‹#›</a:t>
+              <a:t>‹nr.›</a:t>
             </a:fld>
             <a:endParaRPr lang="en-GB"/>
           </a:p>
@@ -3688,7 +3688,7 @@
           <a:p>
             <a:fld id="{76FCA46D-55D7-4D00-B507-F3F903E4163B}" type="datetimeFigureOut">
               <a:rPr lang="en-GB" smtClean="0"/>
-              <a:t>05/05/2019</a:t>
+              <a:t>06/05/2019</a:t>
             </a:fld>
             <a:endParaRPr lang="en-GB"/>
           </a:p>
@@ -3762,7 +3762,7 @@
           <a:p>
             <a:fld id="{BBF25187-E848-42D0-BFD9-F4D5D620A638}" type="slidenum">
               <a:rPr lang="en-GB" smtClean="0"/>
-              <a:t>‹#›</a:t>
+              <a:t>‹nr.›</a:t>
             </a:fld>
             <a:endParaRPr lang="en-GB"/>
           </a:p>
@@ -5372,8 +5372,19 @@
                 <a:latin typeface="Segoe UI" panose="020B0502040204020203" pitchFamily="34" charset="0"/>
                 <a:cs typeface="Segoe UI" panose="020B0502040204020203" pitchFamily="34" charset="0"/>
               </a:rPr>
-              <a:t> 1U</a:t>
-            </a:r>
+              <a:t> 1U </a:t>
+            </a:r>
+            <a:r>
+              <a:rPr lang="en-GB" dirty="0" err="1">
+                <a:latin typeface="Segoe UI" panose="020B0502040204020203" pitchFamily="34" charset="0"/>
+                <a:cs typeface="Segoe UI" panose="020B0502040204020203" pitchFamily="34" charset="0"/>
+              </a:rPr>
+              <a:t>vormfactor</a:t>
+            </a:r>
+            <a:endParaRPr lang="en-GB" dirty="0">
+              <a:latin typeface="Segoe UI" panose="020B0502040204020203" pitchFamily="34" charset="0"/>
+              <a:cs typeface="Segoe UI" panose="020B0502040204020203" pitchFamily="34" charset="0"/>
+            </a:endParaRPr>
           </a:p>
           <a:p>
             <a:pPr marL="0" indent="0">
@@ -5563,42 +5574,14 @@
                 <a:latin typeface="Segoe UI" panose="020B0502040204020203" pitchFamily="34" charset="0"/>
                 <a:cs typeface="Segoe UI" panose="020B0502040204020203" pitchFamily="34" charset="0"/>
               </a:rPr>
-              <a:t> </a:t>
-            </a:r>
-            <a:r>
-              <a:rPr lang="en-GB" dirty="0" err="1">
-                <a:latin typeface="Segoe UI" panose="020B0502040204020203" pitchFamily="34" charset="0"/>
-                <a:cs typeface="Segoe UI" panose="020B0502040204020203" pitchFamily="34" charset="0"/>
-              </a:rPr>
-              <a:t>Meerdere</a:t>
-            </a:r>
-            <a:r>
-              <a:rPr lang="en-GB" dirty="0">
-                <a:latin typeface="Segoe UI" panose="020B0502040204020203" pitchFamily="34" charset="0"/>
-                <a:cs typeface="Segoe UI" panose="020B0502040204020203" pitchFamily="34" charset="0"/>
-              </a:rPr>
-              <a:t> SSIDs (</a:t>
-            </a:r>
-            <a:r>
-              <a:rPr lang="en-GB" dirty="0" err="1">
-                <a:latin typeface="Segoe UI" panose="020B0502040204020203" pitchFamily="34" charset="0"/>
-                <a:cs typeface="Segoe UI" panose="020B0502040204020203" pitchFamily="34" charset="0"/>
-              </a:rPr>
-              <a:t>Wifi</a:t>
-            </a:r>
-            <a:r>
-              <a:rPr lang="en-GB" dirty="0">
-                <a:latin typeface="Segoe UI" panose="020B0502040204020203" pitchFamily="34" charset="0"/>
-                <a:cs typeface="Segoe UI" panose="020B0502040204020203" pitchFamily="34" charset="0"/>
-              </a:rPr>
-              <a:t> </a:t>
-            </a:r>
-            <a:r>
-              <a:rPr lang="en-GB" dirty="0" err="1">
-                <a:latin typeface="Segoe UI" panose="020B0502040204020203" pitchFamily="34" charset="0"/>
-                <a:cs typeface="Segoe UI" panose="020B0502040204020203" pitchFamily="34" charset="0"/>
-              </a:rPr>
-              <a:t>netwerken</a:t>
+              <a:t> Meerdere SSIDs (Guest- en </a:t>
+            </a:r>
+            <a:r>
+              <a:rPr lang="en-GB" dirty="0" err="1">
+                <a:latin typeface="Segoe UI" panose="020B0502040204020203" pitchFamily="34" charset="0"/>
+                <a:cs typeface="Segoe UI" panose="020B0502040204020203" pitchFamily="34" charset="0"/>
+              </a:rPr>
+              <a:t>kantoornetwerk</a:t>
             </a:r>
             <a:r>
               <a:rPr lang="en-GB" dirty="0">
@@ -6383,6 +6366,20 @@
                 <a:cs typeface="Segoe UI" panose="020B0502040204020203" pitchFamily="34" charset="0"/>
               </a:rPr>
               <a:t> 4U </a:t>
+            </a:r>
+            <a:r>
+              <a:rPr lang="en-GB" dirty="0" err="1">
+                <a:latin typeface="Segoe UI" panose="020B0502040204020203" pitchFamily="34" charset="0"/>
+                <a:cs typeface="Segoe UI" panose="020B0502040204020203" pitchFamily="34" charset="0"/>
+              </a:rPr>
+              <a:t>vormfactor</a:t>
+            </a:r>
+            <a:r>
+              <a:rPr lang="en-GB" dirty="0">
+                <a:latin typeface="Segoe UI" panose="020B0502040204020203" pitchFamily="34" charset="0"/>
+                <a:cs typeface="Segoe UI" panose="020B0502040204020203" pitchFamily="34" charset="0"/>
+              </a:rPr>
+              <a:t> </a:t>
             </a:r>
             <a:r>
               <a:rPr lang="en-GB" dirty="0">
@@ -7854,20 +7851,6 @@
                 <a:cs typeface="Segoe UI" panose="020B0502040204020203" pitchFamily="34" charset="0"/>
               </a:rPr>
               <a:t>? </a:t>
-            </a:r>
-            <a:r>
-              <a:rPr lang="en-GB" dirty="0" err="1">
-                <a:latin typeface="Segoe UI" panose="020B0502040204020203" pitchFamily="34" charset="0"/>
-                <a:cs typeface="Segoe UI" panose="020B0502040204020203" pitchFamily="34" charset="0"/>
-              </a:rPr>
-              <a:t>Stel</a:t>
-            </a:r>
-            <a:r>
-              <a:rPr lang="en-GB" dirty="0">
-                <a:latin typeface="Segoe UI" panose="020B0502040204020203" pitchFamily="34" charset="0"/>
-                <a:cs typeface="Segoe UI" panose="020B0502040204020203" pitchFamily="34" charset="0"/>
-              </a:rPr>
-              <a:t> ze</a:t>
             </a:r>
           </a:p>
           <a:p>
@@ -10968,8 +10951,19 @@
                 <a:latin typeface="Segoe UI" panose="020B0502040204020203" pitchFamily="34" charset="0"/>
                 <a:cs typeface="Segoe UI" panose="020B0502040204020203" pitchFamily="34" charset="0"/>
               </a:rPr>
-              <a:t> Server Rack: StarTech - 4U</a:t>
-            </a:r>
+              <a:t> Server Rack: StarTech - 4U </a:t>
+            </a:r>
+            <a:r>
+              <a:rPr lang="en-GB" dirty="0" err="1">
+                <a:latin typeface="Segoe UI" panose="020B0502040204020203" pitchFamily="34" charset="0"/>
+                <a:cs typeface="Segoe UI" panose="020B0502040204020203" pitchFamily="34" charset="0"/>
+              </a:rPr>
+              <a:t>vormfactor</a:t>
+            </a:r>
+            <a:endParaRPr lang="en-GB" dirty="0">
+              <a:latin typeface="Segoe UI" panose="020B0502040204020203" pitchFamily="34" charset="0"/>
+              <a:cs typeface="Segoe UI" panose="020B0502040204020203" pitchFamily="34" charset="0"/>
+            </a:endParaRPr>
           </a:p>
           <a:p>
             <a:pPr>
@@ -11135,6 +11129,13 @@
               <a:buChar char="•"/>
             </a:pPr>
             <a:r>
+              <a:rPr lang="en-GB" dirty="0">
+                <a:latin typeface="Segoe UI" panose="020B0502040204020203" pitchFamily="34" charset="0"/>
+                <a:cs typeface="Segoe UI" panose="020B0502040204020203" pitchFamily="34" charset="0"/>
+              </a:rPr>
+              <a:t> </a:t>
+            </a:r>
+            <a:r>
               <a:rPr lang="en-GB" dirty="0" err="1">
                 <a:latin typeface="Segoe UI" panose="020B0502040204020203" pitchFamily="34" charset="0"/>
                 <a:cs typeface="Segoe UI" panose="020B0502040204020203" pitchFamily="34" charset="0"/>
@@ -11172,8 +11173,19 @@
                 <a:latin typeface="Segoe UI" panose="020B0502040204020203" pitchFamily="34" charset="0"/>
                 <a:cs typeface="Segoe UI" panose="020B0502040204020203" pitchFamily="34" charset="0"/>
               </a:rPr>
-              <a:t>Kabel</a:t>
-            </a:r>
+              <a:t> </a:t>
+            </a:r>
+            <a:r>
+              <a:rPr lang="en-GB" dirty="0" err="1">
+                <a:latin typeface="Segoe UI" panose="020B0502040204020203" pitchFamily="34" charset="0"/>
+                <a:cs typeface="Segoe UI" panose="020B0502040204020203" pitchFamily="34" charset="0"/>
+              </a:rPr>
+              <a:t>Kabelverbinding</a:t>
+            </a:r>
+            <a:endParaRPr lang="en-GB" dirty="0">
+              <a:latin typeface="Segoe UI" panose="020B0502040204020203" pitchFamily="34" charset="0"/>
+              <a:cs typeface="Segoe UI" panose="020B0502040204020203" pitchFamily="34" charset="0"/>
+            </a:endParaRPr>
           </a:p>
           <a:p>
             <a:pPr>
@@ -11490,21 +11502,7 @@
                 <a:latin typeface="Segoe UI" panose="020B0502040204020203" pitchFamily="34" charset="0"/>
                 <a:cs typeface="Segoe UI" panose="020B0502040204020203" pitchFamily="34" charset="0"/>
               </a:rPr>
-              <a:t> router </a:t>
-            </a:r>
-            <a:r>
-              <a:rPr lang="en-GB" dirty="0" err="1">
-                <a:latin typeface="Segoe UI" panose="020B0502040204020203" pitchFamily="34" charset="0"/>
-                <a:cs typeface="Segoe UI" panose="020B0502040204020203" pitchFamily="34" charset="0"/>
-              </a:rPr>
-              <a:t>voor</a:t>
-            </a:r>
-            <a:r>
-              <a:rPr lang="en-GB" dirty="0">
-                <a:latin typeface="Segoe UI" panose="020B0502040204020203" pitchFamily="34" charset="0"/>
-                <a:cs typeface="Segoe UI" panose="020B0502040204020203" pitchFamily="34" charset="0"/>
-              </a:rPr>
-              <a:t> </a:t>
+              <a:t> router voor </a:t>
             </a:r>
             <a:r>
               <a:rPr lang="en-GB" dirty="0" err="1">
@@ -11542,19 +11540,6 @@
                 <a:latin typeface="Segoe UI" panose="020B0502040204020203" pitchFamily="34" charset="0"/>
                 <a:cs typeface="Segoe UI" panose="020B0502040204020203" pitchFamily="34" charset="0"/>
               </a:rPr>
-              <a:t> VPN</a:t>
-            </a:r>
-          </a:p>
-          <a:p>
-            <a:pPr>
-              <a:buFont typeface="Arial" panose="020B0604020202020204" pitchFamily="34" charset="0"/>
-              <a:buChar char="•"/>
-            </a:pPr>
-            <a:r>
-              <a:rPr lang="en-GB" dirty="0">
-                <a:latin typeface="Segoe UI" panose="020B0502040204020203" pitchFamily="34" charset="0"/>
-                <a:cs typeface="Segoe UI" panose="020B0502040204020203" pitchFamily="34" charset="0"/>
-              </a:rPr>
               <a:t> </a:t>
             </a:r>
             <a:r>
@@ -11635,21 +11620,43 @@
                 <a:latin typeface="Segoe UI" panose="020B0502040204020203" pitchFamily="34" charset="0"/>
                 <a:cs typeface="Segoe UI" panose="020B0502040204020203" pitchFamily="34" charset="0"/>
               </a:rPr>
-              <a:t> tot 4k V</a:t>
-            </a:r>
-          </a:p>
-          <a:p>
-            <a:pPr>
-              <a:buFont typeface="Arial" panose="020B0604020202020204" pitchFamily="34" charset="0"/>
-              <a:buChar char="•"/>
-            </a:pPr>
-            <a:r>
-              <a:rPr lang="en-GB" dirty="0">
-                <a:latin typeface="Segoe UI" panose="020B0502040204020203" pitchFamily="34" charset="0"/>
-                <a:cs typeface="Segoe UI" panose="020B0502040204020203" pitchFamily="34" charset="0"/>
-              </a:rPr>
-              <a:t> 1U</a:t>
-            </a:r>
+              <a:t> en </a:t>
+            </a:r>
+            <a:r>
+              <a:rPr lang="en-GB" dirty="0" err="1">
+                <a:latin typeface="Segoe UI" panose="020B0502040204020203" pitchFamily="34" charset="0"/>
+                <a:cs typeface="Segoe UI" panose="020B0502040204020203" pitchFamily="34" charset="0"/>
+              </a:rPr>
+              <a:t>stroomstoten</a:t>
+            </a:r>
+            <a:endParaRPr lang="en-GB" dirty="0">
+              <a:latin typeface="Segoe UI" panose="020B0502040204020203" pitchFamily="34" charset="0"/>
+              <a:cs typeface="Segoe UI" panose="020B0502040204020203" pitchFamily="34" charset="0"/>
+            </a:endParaRPr>
+          </a:p>
+          <a:p>
+            <a:pPr>
+              <a:buFont typeface="Arial" panose="020B0604020202020204" pitchFamily="34" charset="0"/>
+              <a:buChar char="•"/>
+            </a:pPr>
+            <a:r>
+              <a:rPr lang="en-GB" dirty="0">
+                <a:latin typeface="Segoe UI" panose="020B0502040204020203" pitchFamily="34" charset="0"/>
+                <a:cs typeface="Segoe UI" panose="020B0502040204020203" pitchFamily="34" charset="0"/>
+              </a:rPr>
+              <a:t> 1U </a:t>
+            </a:r>
+            <a:r>
+              <a:rPr lang="en-GB" dirty="0" err="1">
+                <a:latin typeface="Segoe UI" panose="020B0502040204020203" pitchFamily="34" charset="0"/>
+                <a:cs typeface="Segoe UI" panose="020B0502040204020203" pitchFamily="34" charset="0"/>
+              </a:rPr>
+              <a:t>vormfactor</a:t>
+            </a:r>
+            <a:endParaRPr lang="en-GB" dirty="0">
+              <a:latin typeface="Segoe UI" panose="020B0502040204020203" pitchFamily="34" charset="0"/>
+              <a:cs typeface="Segoe UI" panose="020B0502040204020203" pitchFamily="34" charset="0"/>
+            </a:endParaRPr>
           </a:p>
           <a:p>
             <a:pPr>
@@ -11928,8 +11935,19 @@
                 <a:latin typeface="Segoe UI" panose="020B0502040204020203" pitchFamily="34" charset="0"/>
                 <a:cs typeface="Segoe UI" panose="020B0502040204020203" pitchFamily="34" charset="0"/>
               </a:rPr>
-              <a:t> 1U</a:t>
-            </a:r>
+              <a:t> 1U </a:t>
+            </a:r>
+            <a:r>
+              <a:rPr lang="en-GB" dirty="0" err="1">
+                <a:latin typeface="Segoe UI" panose="020B0502040204020203" pitchFamily="34" charset="0"/>
+                <a:cs typeface="Segoe UI" panose="020B0502040204020203" pitchFamily="34" charset="0"/>
+              </a:rPr>
+              <a:t>vormfactor</a:t>
+            </a:r>
+            <a:endParaRPr lang="en-GB" dirty="0">
+              <a:latin typeface="Segoe UI" panose="020B0502040204020203" pitchFamily="34" charset="0"/>
+              <a:cs typeface="Segoe UI" panose="020B0502040204020203" pitchFamily="34" charset="0"/>
+            </a:endParaRPr>
           </a:p>
           <a:p>
             <a:pPr>
@@ -12141,6 +12159,59 @@
                 <a:latin typeface="Segoe UI" panose="020B0502040204020203" pitchFamily="34" charset="0"/>
                 <a:cs typeface="Segoe UI" panose="020B0502040204020203" pitchFamily="34" charset="0"/>
               </a:rPr>
+              <a:t> Meerdere SSIDs (Guest- en </a:t>
+            </a:r>
+            <a:r>
+              <a:rPr lang="en-GB" dirty="0" err="1">
+                <a:latin typeface="Segoe UI" panose="020B0502040204020203" pitchFamily="34" charset="0"/>
+                <a:cs typeface="Segoe UI" panose="020B0502040204020203" pitchFamily="34" charset="0"/>
+              </a:rPr>
+              <a:t>Kantoornetwerk</a:t>
+            </a:r>
+            <a:r>
+              <a:rPr lang="en-GB" dirty="0">
+                <a:latin typeface="Segoe UI" panose="020B0502040204020203" pitchFamily="34" charset="0"/>
+                <a:cs typeface="Segoe UI" panose="020B0502040204020203" pitchFamily="34" charset="0"/>
+              </a:rPr>
+              <a:t>)</a:t>
+            </a:r>
+          </a:p>
+          <a:p>
+            <a:pPr>
+              <a:buFont typeface="Arial" panose="020B0604020202020204" pitchFamily="34" charset="0"/>
+              <a:buChar char="•"/>
+            </a:pPr>
+            <a:r>
+              <a:rPr lang="en-GB" dirty="0">
+                <a:latin typeface="Segoe UI" panose="020B0502040204020203" pitchFamily="34" charset="0"/>
+                <a:cs typeface="Segoe UI" panose="020B0502040204020203" pitchFamily="34" charset="0"/>
+              </a:rPr>
+              <a:t> Captive Portal</a:t>
+            </a:r>
+          </a:p>
+          <a:p>
+            <a:pPr>
+              <a:buFont typeface="Arial" panose="020B0604020202020204" pitchFamily="34" charset="0"/>
+              <a:buChar char="•"/>
+            </a:pPr>
+            <a:r>
+              <a:rPr lang="en-GB" dirty="0">
+                <a:latin typeface="Segoe UI" panose="020B0502040204020203" pitchFamily="34" charset="0"/>
+                <a:cs typeface="Segoe UI" panose="020B0502040204020203" pitchFamily="34" charset="0"/>
+              </a:rPr>
+              <a:t> Scheduling</a:t>
+            </a:r>
+          </a:p>
+          <a:p>
+            <a:pPr>
+              <a:buFont typeface="Arial" panose="020B0604020202020204" pitchFamily="34" charset="0"/>
+              <a:buChar char="•"/>
+            </a:pPr>
+            <a:r>
+              <a:rPr lang="en-GB" dirty="0">
+                <a:latin typeface="Segoe UI" panose="020B0502040204020203" pitchFamily="34" charset="0"/>
+                <a:cs typeface="Segoe UI" panose="020B0502040204020203" pitchFamily="34" charset="0"/>
+              </a:rPr>
               <a:t> </a:t>
             </a:r>
             <a:r>
@@ -12148,21 +12219,7 @@
                 <a:latin typeface="Segoe UI" panose="020B0502040204020203" pitchFamily="34" charset="0"/>
                 <a:cs typeface="Segoe UI" panose="020B0502040204020203" pitchFamily="34" charset="0"/>
               </a:rPr>
-              <a:t>Meerdere</a:t>
-            </a:r>
-            <a:r>
-              <a:rPr lang="en-GB" dirty="0">
-                <a:latin typeface="Segoe UI" panose="020B0502040204020203" pitchFamily="34" charset="0"/>
-                <a:cs typeface="Segoe UI" panose="020B0502040204020203" pitchFamily="34" charset="0"/>
-              </a:rPr>
-              <a:t> SSIDs (</a:t>
-            </a:r>
-            <a:r>
-              <a:rPr lang="en-GB" dirty="0" err="1">
-                <a:latin typeface="Segoe UI" panose="020B0502040204020203" pitchFamily="34" charset="0"/>
-                <a:cs typeface="Segoe UI" panose="020B0502040204020203" pitchFamily="34" charset="0"/>
-              </a:rPr>
-              <a:t>Wifi</a:t>
+              <a:t>Gemakkelijke</a:t>
             </a:r>
             <a:r>
               <a:rPr lang="en-GB" dirty="0">
@@ -12176,73 +12233,6 @@
                 <a:latin typeface="Segoe UI" panose="020B0502040204020203" pitchFamily="34" charset="0"/>
                 <a:cs typeface="Segoe UI" panose="020B0502040204020203" pitchFamily="34" charset="0"/>
               </a:rPr>
-              <a:t>netwerken</a:t>
-            </a:r>
-            <a:r>
-              <a:rPr lang="en-GB" dirty="0">
-                <a:latin typeface="Segoe UI" panose="020B0502040204020203" pitchFamily="34" charset="0"/>
-                <a:cs typeface="Segoe UI" panose="020B0502040204020203" pitchFamily="34" charset="0"/>
-              </a:rPr>
-              <a:t>)</a:t>
-            </a:r>
-          </a:p>
-          <a:p>
-            <a:pPr>
-              <a:buFont typeface="Arial" panose="020B0604020202020204" pitchFamily="34" charset="0"/>
-              <a:buChar char="•"/>
-            </a:pPr>
-            <a:r>
-              <a:rPr lang="en-GB" dirty="0">
-                <a:latin typeface="Segoe UI" panose="020B0502040204020203" pitchFamily="34" charset="0"/>
-                <a:cs typeface="Segoe UI" panose="020B0502040204020203" pitchFamily="34" charset="0"/>
-              </a:rPr>
-              <a:t> Captive Portal</a:t>
-            </a:r>
-          </a:p>
-          <a:p>
-            <a:pPr>
-              <a:buFont typeface="Arial" panose="020B0604020202020204" pitchFamily="34" charset="0"/>
-              <a:buChar char="•"/>
-            </a:pPr>
-            <a:r>
-              <a:rPr lang="en-GB" dirty="0">
-                <a:latin typeface="Segoe UI" panose="020B0502040204020203" pitchFamily="34" charset="0"/>
-                <a:cs typeface="Segoe UI" panose="020B0502040204020203" pitchFamily="34" charset="0"/>
-              </a:rPr>
-              <a:t> Scheduling</a:t>
-            </a:r>
-          </a:p>
-          <a:p>
-            <a:pPr>
-              <a:buFont typeface="Arial" panose="020B0604020202020204" pitchFamily="34" charset="0"/>
-              <a:buChar char="•"/>
-            </a:pPr>
-            <a:r>
-              <a:rPr lang="en-GB" dirty="0">
-                <a:latin typeface="Segoe UI" panose="020B0502040204020203" pitchFamily="34" charset="0"/>
-                <a:cs typeface="Segoe UI" panose="020B0502040204020203" pitchFamily="34" charset="0"/>
-              </a:rPr>
-              <a:t> </a:t>
-            </a:r>
-            <a:r>
-              <a:rPr lang="en-GB" dirty="0" err="1">
-                <a:latin typeface="Segoe UI" panose="020B0502040204020203" pitchFamily="34" charset="0"/>
-                <a:cs typeface="Segoe UI" panose="020B0502040204020203" pitchFamily="34" charset="0"/>
-              </a:rPr>
-              <a:t>Gemakkelijke</a:t>
-            </a:r>
-            <a:r>
-              <a:rPr lang="en-GB" dirty="0">
-                <a:latin typeface="Segoe UI" panose="020B0502040204020203" pitchFamily="34" charset="0"/>
-                <a:cs typeface="Segoe UI" panose="020B0502040204020203" pitchFamily="34" charset="0"/>
-              </a:rPr>
-              <a:t> </a:t>
-            </a:r>
-            <a:r>
-              <a:rPr lang="en-GB" dirty="0" err="1">
-                <a:latin typeface="Segoe UI" panose="020B0502040204020203" pitchFamily="34" charset="0"/>
-                <a:cs typeface="Segoe UI" panose="020B0502040204020203" pitchFamily="34" charset="0"/>
-              </a:rPr>
               <a:t>meegeleverde</a:t>
             </a:r>
             <a:r>
@@ -12263,21 +12253,7 @@
                 <a:latin typeface="Segoe UI" panose="020B0502040204020203" pitchFamily="34" charset="0"/>
                 <a:cs typeface="Segoe UI" panose="020B0502040204020203" pitchFamily="34" charset="0"/>
               </a:rPr>
-              <a:t>Wand– </a:t>
-            </a:r>
-            <a:r>
-              <a:rPr lang="en-GB" dirty="0" err="1">
-                <a:latin typeface="Segoe UI" panose="020B0502040204020203" pitchFamily="34" charset="0"/>
-                <a:cs typeface="Segoe UI" panose="020B0502040204020203" pitchFamily="34" charset="0"/>
-              </a:rPr>
-              <a:t>en</a:t>
-            </a:r>
-            <a:r>
-              <a:rPr lang="en-GB" dirty="0">
-                <a:latin typeface="Segoe UI" panose="020B0502040204020203" pitchFamily="34" charset="0"/>
-                <a:cs typeface="Segoe UI" panose="020B0502040204020203" pitchFamily="34" charset="0"/>
-              </a:rPr>
-              <a:t> </a:t>
+              <a:t> Wand– en </a:t>
             </a:r>
             <a:r>
               <a:rPr lang="en-GB" dirty="0" err="1">

</xml_diff>